<commit_message>
Updated presentation to include fixed metrics
</commit_message>
<xml_diff>
--- a/docs/Synthea Capstone Project Presentation.pptx
+++ b/docs/Synthea Capstone Project Presentation.pptx
@@ -20,7 +20,7 @@
     <p:sldId id="271" r:id="rId14"/>
     <p:sldId id="272" r:id="rId15"/>
     <p:sldId id="274" r:id="rId16"/>
-    <p:sldId id="273" r:id="rId17"/>
+    <p:sldId id="276" r:id="rId17"/>
     <p:sldId id="263" r:id="rId18"/>
   </p:sldIdLst>
   <p:sldSz cx="12192000" cy="6858000"/>
@@ -120,6 +120,11 @@
       </a:defRPr>
     </a:lvl9pPr>
   </p:defaultTextStyle>
+  <p:extLst>
+    <p:ext uri="{EFAFB233-063F-42B5-8137-9DF3F51BA10A}">
+      <p15:sldGuideLst xmlns:p15="http://schemas.microsoft.com/office/powerpoint/2012/main"/>
+    </p:ext>
+  </p:extLst>
 </p:presentation>
 </file>
 
@@ -270,7 +275,7 @@
           <a:p>
             <a:fld id="{76969C88-B244-455D-A017-012B25B1ACDD}" type="datetimeFigureOut">
               <a:rPr lang="en-US" smtClean="0"/>
-              <a:t>12/5/2024</a:t>
+              <a:t>12/10/2024</a:t>
             </a:fld>
             <a:endParaRPr lang="en-US"/>
           </a:p>
@@ -468,7 +473,7 @@
           <a:p>
             <a:fld id="{76969C88-B244-455D-A017-012B25B1ACDD}" type="datetimeFigureOut">
               <a:rPr lang="en-US" smtClean="0"/>
-              <a:t>12/5/2024</a:t>
+              <a:t>12/10/2024</a:t>
             </a:fld>
             <a:endParaRPr lang="en-US"/>
           </a:p>
@@ -676,7 +681,7 @@
           <a:p>
             <a:fld id="{76969C88-B244-455D-A017-012B25B1ACDD}" type="datetimeFigureOut">
               <a:rPr lang="en-US" smtClean="0"/>
-              <a:t>12/5/2024</a:t>
+              <a:t>12/10/2024</a:t>
             </a:fld>
             <a:endParaRPr lang="en-US"/>
           </a:p>
@@ -875,7 +880,7 @@
           <a:p>
             <a:fld id="{76969C88-B244-455D-A017-012B25B1ACDD}" type="datetimeFigureOut">
               <a:rPr lang="en-US" smtClean="0"/>
-              <a:t>12/5/2024</a:t>
+              <a:t>12/10/2024</a:t>
             </a:fld>
             <a:endParaRPr lang="en-US"/>
           </a:p>
@@ -1150,7 +1155,7 @@
           <a:p>
             <a:fld id="{76969C88-B244-455D-A017-012B25B1ACDD}" type="datetimeFigureOut">
               <a:rPr lang="en-US" smtClean="0"/>
-              <a:t>12/5/2024</a:t>
+              <a:t>12/10/2024</a:t>
             </a:fld>
             <a:endParaRPr lang="en-US"/>
           </a:p>
@@ -1415,7 +1420,7 @@
           <a:p>
             <a:fld id="{76969C88-B244-455D-A017-012B25B1ACDD}" type="datetimeFigureOut">
               <a:rPr lang="en-US" smtClean="0"/>
-              <a:t>12/5/2024</a:t>
+              <a:t>12/10/2024</a:t>
             </a:fld>
             <a:endParaRPr lang="en-US"/>
           </a:p>
@@ -1827,7 +1832,7 @@
           <a:p>
             <a:fld id="{76969C88-B244-455D-A017-012B25B1ACDD}" type="datetimeFigureOut">
               <a:rPr lang="en-US" smtClean="0"/>
-              <a:t>12/5/2024</a:t>
+              <a:t>12/10/2024</a:t>
             </a:fld>
             <a:endParaRPr lang="en-US"/>
           </a:p>
@@ -1968,7 +1973,7 @@
           <a:p>
             <a:fld id="{76969C88-B244-455D-A017-012B25B1ACDD}" type="datetimeFigureOut">
               <a:rPr lang="en-US" smtClean="0"/>
-              <a:t>12/5/2024</a:t>
+              <a:t>12/10/2024</a:t>
             </a:fld>
             <a:endParaRPr lang="en-US"/>
           </a:p>
@@ -2081,7 +2086,7 @@
           <a:p>
             <a:fld id="{76969C88-B244-455D-A017-012B25B1ACDD}" type="datetimeFigureOut">
               <a:rPr lang="en-US" smtClean="0"/>
-              <a:t>12/5/2024</a:t>
+              <a:t>12/10/2024</a:t>
             </a:fld>
             <a:endParaRPr lang="en-US"/>
           </a:p>
@@ -2393,7 +2398,7 @@
           <a:p>
             <a:fld id="{76969C88-B244-455D-A017-012B25B1ACDD}" type="datetimeFigureOut">
               <a:rPr lang="en-US" smtClean="0"/>
-              <a:t>12/5/2024</a:t>
+              <a:t>12/10/2024</a:t>
             </a:fld>
             <a:endParaRPr lang="en-US"/>
           </a:p>
@@ -2684,7 +2689,7 @@
           <a:p>
             <a:fld id="{76969C88-B244-455D-A017-012B25B1ACDD}" type="datetimeFigureOut">
               <a:rPr lang="en-US" smtClean="0"/>
-              <a:t>12/5/2024</a:t>
+              <a:t>12/10/2024</a:t>
             </a:fld>
             <a:endParaRPr lang="en-US"/>
           </a:p>
@@ -3440,7 +3445,7 @@
             <a:fld id="{76969C88-B244-455D-A017-012B25B1ACDD}" type="datetimeFigureOut">
               <a:rPr lang="en-US" smtClean="0"/>
               <a:pPr/>
-              <a:t>12/5/2024</a:t>
+              <a:t>12/10/2024</a:t>
             </a:fld>
             <a:endParaRPr lang="en-US"/>
           </a:p>
@@ -6550,13 +6555,13 @@
           <a:p>
             <a:r>
               <a:rPr lang="en-US" dirty="0"/>
-              <a:t>R-squared – 0.9495</a:t>
+              <a:t>Cross validation R-squared: 0.6649</a:t>
             </a:r>
           </a:p>
           <a:p>
             <a:r>
               <a:rPr lang="en-US" dirty="0"/>
-              <a:t>Mean absolute error – 2,379.54</a:t>
+              <a:t>Cross validation mean absolute error: 6,583.35</a:t>
             </a:r>
           </a:p>
         </p:txBody>
@@ -7010,14 +7015,6 @@
 <file path=ppt/slides/slide16.xml><?xml version="1.0" encoding="utf-8"?>
 <p:sld xmlns:a="http://schemas.openxmlformats.org/drawingml/2006/main" xmlns:r="http://schemas.openxmlformats.org/officeDocument/2006/relationships" xmlns:p="http://schemas.openxmlformats.org/presentationml/2006/main">
   <p:cSld>
-    <p:bg>
-      <p:bgPr>
-        <a:solidFill>
-          <a:schemeClr val="bg2"/>
-        </a:solidFill>
-        <a:effectLst/>
-      </p:bgPr>
-    </p:bg>
     <p:spTree>
       <p:nvGrpSpPr>
         <p:cNvPr id="1" name=""/>
@@ -7032,483 +7029,12 @@
           <a:chExt cx="0" cy="0"/>
         </a:xfrm>
       </p:grpSpPr>
-      <p:sp useBgFill="1">
-        <p:nvSpPr>
-          <p:cNvPr id="13" name="Rectangle 12">
-            <a:extLst>
-              <a:ext uri="{FF2B5EF4-FFF2-40B4-BE49-F238E27FC236}">
-                <a16:creationId xmlns:a16="http://schemas.microsoft.com/office/drawing/2014/main" id="{987A0FBA-CC04-4256-A8EB-BB3C543E989C}"/>
-              </a:ext>
-              <a:ext uri="{C183D7F6-B498-43B3-948B-1728B52AA6E4}">
-                <adec:decorative xmlns:adec="http://schemas.microsoft.com/office/drawing/2017/decorative" val="1"/>
-              </a:ext>
-            </a:extLst>
-          </p:cNvPr>
-          <p:cNvSpPr>
-            <a:spLocks noGrp="1" noRot="1" noChangeAspect="1" noMove="1" noResize="1" noEditPoints="1" noAdjustHandles="1" noChangeArrowheads="1" noChangeShapeType="1" noTextEdit="1"/>
-          </p:cNvSpPr>
-          <p:nvPr>
-            <p:extLst>
-              <p:ext uri="{386F3935-93C4-4BCD-93E2-E3B085C9AB24}">
-                <p16:designElem xmlns:p16="http://schemas.microsoft.com/office/powerpoint/2015/main" val="1"/>
-              </p:ext>
-            </p:extLst>
-          </p:nvPr>
-        </p:nvSpPr>
-        <p:spPr>
-          <a:xfrm>
-            <a:off x="0" y="0"/>
-            <a:ext cx="12192000" cy="6858000"/>
-          </a:xfrm>
-          <a:prstGeom prst="rect">
-            <a:avLst/>
-          </a:prstGeom>
-          <a:ln w="12700" cap="flat" cmpd="sng" algn="ctr">
-            <a:noFill/>
-            <a:prstDash val="solid"/>
-            <a:miter lim="800000"/>
-          </a:ln>
-          <a:effectLst/>
-          <a:extLst>
-            <a:ext uri="{91240B29-F687-4F45-9708-019B960494DF}">
-              <a14:hiddenLine xmlns:a14="http://schemas.microsoft.com/office/drawing/2010/main" w="12700" cap="flat" cmpd="sng" algn="ctr">
-                <a:solidFill>
-                  <a:schemeClr val="accent1">
-                    <a:shade val="50000"/>
-                  </a:schemeClr>
-                </a:solidFill>
-                <a:prstDash val="solid"/>
-                <a:miter lim="800000"/>
-              </a14:hiddenLine>
-            </a:ext>
-          </a:extLst>
-        </p:spPr>
-        <p:style>
-          <a:lnRef idx="2">
-            <a:schemeClr val="accent1">
-              <a:shade val="50000"/>
-            </a:schemeClr>
-          </a:lnRef>
-          <a:fillRef idx="1">
-            <a:schemeClr val="accent1"/>
-          </a:fillRef>
-          <a:effectRef idx="0">
-            <a:schemeClr val="accent1"/>
-          </a:effectRef>
-          <a:fontRef idx="minor">
-            <a:schemeClr val="lt1"/>
-          </a:fontRef>
-        </p:style>
-        <p:txBody>
-          <a:bodyPr rtlCol="0" anchor="ctr"/>
-          <a:lstStyle/>
-          <a:p>
-            <a:pPr algn="ctr"/>
-            <a:endParaRPr lang="en-US"/>
-          </a:p>
-        </p:txBody>
-      </p:sp>
-      <p:pic>
-        <p:nvPicPr>
-          <p:cNvPr id="14" name="Picture 13" descr="A close-up of a graph&#10;&#10;Description automatically generated">
-            <a:extLst>
-              <a:ext uri="{FF2B5EF4-FFF2-40B4-BE49-F238E27FC236}">
-                <a16:creationId xmlns:a16="http://schemas.microsoft.com/office/drawing/2014/main" id="{DCC14132-18D1-6991-887D-056FD4C53DCF}"/>
-              </a:ext>
-            </a:extLst>
-          </p:cNvPr>
-          <p:cNvPicPr>
-            <a:picLocks noChangeAspect="1"/>
-          </p:cNvPicPr>
-          <p:nvPr/>
-        </p:nvPicPr>
-        <p:blipFill>
-          <a:blip r:embed="rId2"/>
-          <a:srcRect l="6767" r="41176" b="-1"/>
-          <a:stretch/>
-        </p:blipFill>
-        <p:spPr>
-          <a:xfrm>
-            <a:off x="2" y="10"/>
-            <a:ext cx="5578823" cy="6028246"/>
-          </a:xfrm>
-          <a:custGeom>
-            <a:avLst/>
-            <a:gdLst/>
-            <a:ahLst/>
-            <a:cxnLst/>
-            <a:rect l="l" t="t" r="r" b="b"/>
-            <a:pathLst>
-              <a:path w="5578823" h="6028256">
-                <a:moveTo>
-                  <a:pt x="0" y="0"/>
-                </a:moveTo>
-                <a:lnTo>
-                  <a:pt x="3897606" y="0"/>
-                </a:lnTo>
-                <a:lnTo>
-                  <a:pt x="4274232" y="360545"/>
-                </a:lnTo>
-                <a:cubicBezTo>
-                  <a:pt x="4408856" y="488910"/>
-                  <a:pt x="4542134" y="615181"/>
-                  <a:pt x="4673934" y="738354"/>
-                </a:cubicBezTo>
-                <a:cubicBezTo>
-                  <a:pt x="5042663" y="1082881"/>
-                  <a:pt x="5282330" y="1428108"/>
-                  <a:pt x="5421862" y="1773839"/>
-                </a:cubicBezTo>
-                <a:cubicBezTo>
-                  <a:pt x="5631101" y="2292214"/>
-                  <a:pt x="5614731" y="2811325"/>
-                  <a:pt x="5469198" y="3329255"/>
-                </a:cubicBezTo>
-                <a:cubicBezTo>
-                  <a:pt x="5323662" y="3847185"/>
-                  <a:pt x="5048962" y="4363935"/>
-                  <a:pt x="4741546" y="4877588"/>
-                </a:cubicBezTo>
-                <a:cubicBezTo>
-                  <a:pt x="4027238" y="6071494"/>
-                  <a:pt x="2764972" y="6102970"/>
-                  <a:pt x="1325600" y="5980388"/>
-                </a:cubicBezTo>
-                <a:cubicBezTo>
-                  <a:pt x="903947" y="5944442"/>
-                  <a:pt x="499735" y="5907589"/>
-                  <a:pt x="137593" y="5804042"/>
-                </a:cubicBezTo>
-                <a:lnTo>
-                  <a:pt x="0" y="5760161"/>
-                </a:lnTo>
-                <a:close/>
-              </a:path>
-            </a:pathLst>
-          </a:custGeom>
-        </p:spPr>
-      </p:pic>
-      <p:sp>
-        <p:nvSpPr>
-          <p:cNvPr id="15" name="Freeform: Shape 14">
-            <a:extLst>
-              <a:ext uri="{FF2B5EF4-FFF2-40B4-BE49-F238E27FC236}">
-                <a16:creationId xmlns:a16="http://schemas.microsoft.com/office/drawing/2014/main" id="{E633B38B-B87A-4288-A20F-0223A6C27A5A}"/>
-              </a:ext>
-              <a:ext uri="{C183D7F6-B498-43B3-948B-1728B52AA6E4}">
-                <adec:decorative xmlns:adec="http://schemas.microsoft.com/office/drawing/2017/decorative" val="1"/>
-              </a:ext>
-            </a:extLst>
-          </p:cNvPr>
-          <p:cNvSpPr>
-            <a:spLocks noGrp="1" noRot="1" noChangeAspect="1" noMove="1" noResize="1" noEditPoints="1" noAdjustHandles="1" noChangeArrowheads="1" noChangeShapeType="1" noTextEdit="1"/>
-          </p:cNvSpPr>
-          <p:nvPr>
-            <p:extLst>
-              <p:ext uri="{386F3935-93C4-4BCD-93E2-E3B085C9AB24}">
-                <p16:designElem xmlns:p16="http://schemas.microsoft.com/office/powerpoint/2015/main" val="1"/>
-              </p:ext>
-            </p:extLst>
-          </p:nvPr>
-        </p:nvSpPr>
-        <p:spPr>
-          <a:xfrm>
-            <a:off x="-1" y="0"/>
-            <a:ext cx="5704117" cy="6096000"/>
-          </a:xfrm>
-          <a:custGeom>
-            <a:avLst/>
-            <a:gdLst>
-              <a:gd name="connsiteX0" fmla="*/ 0 w 5704117"/>
-              <a:gd name="connsiteY0" fmla="*/ 0 h 6096000"/>
-              <a:gd name="connsiteX1" fmla="*/ 4562795 w 5704117"/>
-              <a:gd name="connsiteY1" fmla="*/ 0 h 6096000"/>
-              <a:gd name="connsiteX2" fmla="*/ 4721192 w 5704117"/>
-              <a:gd name="connsiteY2" fmla="*/ 133595 h 6096000"/>
-              <a:gd name="connsiteX3" fmla="*/ 5467522 w 5704117"/>
-              <a:gd name="connsiteY3" fmla="*/ 1054328 h 6096000"/>
-              <a:gd name="connsiteX4" fmla="*/ 5538873 w 5704117"/>
-              <a:gd name="connsiteY4" fmla="*/ 2897564 h 6096000"/>
-              <a:gd name="connsiteX5" fmla="*/ 4442050 w 5704117"/>
-              <a:gd name="connsiteY5" fmla="*/ 4732407 h 6096000"/>
-              <a:gd name="connsiteX6" fmla="*/ 93046 w 5704117"/>
-              <a:gd name="connsiteY6" fmla="*/ 6082857 h 6096000"/>
-              <a:gd name="connsiteX7" fmla="*/ 0 w 5704117"/>
-              <a:gd name="connsiteY7" fmla="*/ 6078450 h 6096000"/>
-              <a:gd name="connsiteX0" fmla="*/ 4562795 w 5704117"/>
-              <a:gd name="connsiteY0" fmla="*/ 0 h 6096000"/>
-              <a:gd name="connsiteX1" fmla="*/ 4721192 w 5704117"/>
-              <a:gd name="connsiteY1" fmla="*/ 133595 h 6096000"/>
-              <a:gd name="connsiteX2" fmla="*/ 5467522 w 5704117"/>
-              <a:gd name="connsiteY2" fmla="*/ 1054328 h 6096000"/>
-              <a:gd name="connsiteX3" fmla="*/ 5538873 w 5704117"/>
-              <a:gd name="connsiteY3" fmla="*/ 2897564 h 6096000"/>
-              <a:gd name="connsiteX4" fmla="*/ 4442050 w 5704117"/>
-              <a:gd name="connsiteY4" fmla="*/ 4732407 h 6096000"/>
-              <a:gd name="connsiteX5" fmla="*/ 93046 w 5704117"/>
-              <a:gd name="connsiteY5" fmla="*/ 6082857 h 6096000"/>
-              <a:gd name="connsiteX6" fmla="*/ 0 w 5704117"/>
-              <a:gd name="connsiteY6" fmla="*/ 6078450 h 6096000"/>
-              <a:gd name="connsiteX7" fmla="*/ 91440 w 5704117"/>
-              <a:gd name="connsiteY7" fmla="*/ 91440 h 6096000"/>
-              <a:gd name="connsiteX0" fmla="*/ 4562795 w 5704117"/>
-              <a:gd name="connsiteY0" fmla="*/ 0 h 6096000"/>
-              <a:gd name="connsiteX1" fmla="*/ 4721192 w 5704117"/>
-              <a:gd name="connsiteY1" fmla="*/ 133595 h 6096000"/>
-              <a:gd name="connsiteX2" fmla="*/ 5467522 w 5704117"/>
-              <a:gd name="connsiteY2" fmla="*/ 1054328 h 6096000"/>
-              <a:gd name="connsiteX3" fmla="*/ 5538873 w 5704117"/>
-              <a:gd name="connsiteY3" fmla="*/ 2897564 h 6096000"/>
-              <a:gd name="connsiteX4" fmla="*/ 4442050 w 5704117"/>
-              <a:gd name="connsiteY4" fmla="*/ 4732407 h 6096000"/>
-              <a:gd name="connsiteX5" fmla="*/ 93046 w 5704117"/>
-              <a:gd name="connsiteY5" fmla="*/ 6082857 h 6096000"/>
-              <a:gd name="connsiteX6" fmla="*/ 0 w 5704117"/>
-              <a:gd name="connsiteY6" fmla="*/ 6078450 h 6096000"/>
-            </a:gdLst>
-            <a:ahLst/>
-            <a:cxnLst>
-              <a:cxn ang="0">
-                <a:pos x="connsiteX0" y="connsiteY0"/>
-              </a:cxn>
-              <a:cxn ang="0">
-                <a:pos x="connsiteX1" y="connsiteY1"/>
-              </a:cxn>
-              <a:cxn ang="0">
-                <a:pos x="connsiteX2" y="connsiteY2"/>
-              </a:cxn>
-              <a:cxn ang="0">
-                <a:pos x="connsiteX3" y="connsiteY3"/>
-              </a:cxn>
-              <a:cxn ang="0">
-                <a:pos x="connsiteX4" y="connsiteY4"/>
-              </a:cxn>
-              <a:cxn ang="0">
-                <a:pos x="connsiteX5" y="connsiteY5"/>
-              </a:cxn>
-              <a:cxn ang="0">
-                <a:pos x="connsiteX6" y="connsiteY6"/>
-              </a:cxn>
-            </a:cxnLst>
-            <a:rect l="l" t="t" r="r" b="b"/>
-            <a:pathLst>
-              <a:path w="5704117" h="6096000">
-                <a:moveTo>
-                  <a:pt x="4562795" y="0"/>
-                </a:moveTo>
-                <a:lnTo>
-                  <a:pt x="4721192" y="133595"/>
-                </a:lnTo>
-                <a:cubicBezTo>
-                  <a:pt x="5067135" y="440105"/>
-                  <a:pt x="5309779" y="747048"/>
-                  <a:pt x="5467522" y="1054328"/>
-                </a:cubicBezTo>
-                <a:cubicBezTo>
-                  <a:pt x="5782917" y="1668625"/>
-                  <a:pt x="5758242" y="2283795"/>
-                  <a:pt x="5538873" y="2897564"/>
-                </a:cubicBezTo>
-                <a:cubicBezTo>
-                  <a:pt x="5319500" y="3511334"/>
-                  <a:pt x="4905433" y="4123706"/>
-                  <a:pt x="4442050" y="4732407"/>
-                </a:cubicBezTo>
-                <a:cubicBezTo>
-                  <a:pt x="3499930" y="5970384"/>
-                  <a:pt x="1925433" y="6153690"/>
-                  <a:pt x="93046" y="6082857"/>
-                </a:cubicBezTo>
-                <a:lnTo>
-                  <a:pt x="0" y="6078450"/>
-                </a:lnTo>
-              </a:path>
-            </a:pathLst>
-          </a:custGeom>
-          <a:noFill/>
-          <a:ln w="19050">
-            <a:solidFill>
-              <a:schemeClr val="accent2">
-                <a:lumMod val="60000"/>
-                <a:lumOff val="40000"/>
-              </a:schemeClr>
-            </a:solidFill>
-          </a:ln>
-        </p:spPr>
-        <p:style>
-          <a:lnRef idx="2">
-            <a:schemeClr val="accent1">
-              <a:shade val="50000"/>
-            </a:schemeClr>
-          </a:lnRef>
-          <a:fillRef idx="1">
-            <a:schemeClr val="accent1"/>
-          </a:fillRef>
-          <a:effectRef idx="0">
-            <a:schemeClr val="accent1"/>
-          </a:effectRef>
-          <a:fontRef idx="minor">
-            <a:schemeClr val="lt1"/>
-          </a:fontRef>
-        </p:style>
-        <p:txBody>
-          <a:bodyPr wrap="square" rtlCol="0" anchor="ctr">
-            <a:noAutofit/>
-          </a:bodyPr>
-          <a:lstStyle/>
-          <a:p>
-            <a:pPr algn="ctr"/>
-            <a:endParaRPr lang="en-US">
-              <a:solidFill>
-                <a:prstClr val="white"/>
-              </a:solidFill>
-              <a:latin typeface="Avenir Next LT Pro Light"/>
-            </a:endParaRPr>
-          </a:p>
-        </p:txBody>
-      </p:sp>
-      <p:sp>
-        <p:nvSpPr>
-          <p:cNvPr id="3" name="Content Placeholder 2">
-            <a:extLst>
-              <a:ext uri="{FF2B5EF4-FFF2-40B4-BE49-F238E27FC236}">
-                <a16:creationId xmlns:a16="http://schemas.microsoft.com/office/drawing/2014/main" id="{76E59F52-50C1-C757-376B-FD5E5619874D}"/>
-              </a:ext>
-            </a:extLst>
-          </p:cNvPr>
-          <p:cNvSpPr>
-            <a:spLocks noGrp="1"/>
-          </p:cNvSpPr>
-          <p:nvPr>
-            <p:ph idx="1"/>
-          </p:nvPr>
-        </p:nvSpPr>
-        <p:spPr>
-          <a:xfrm>
-            <a:off x="5965825" y="1885951"/>
-            <a:ext cx="5704118" cy="4695824"/>
-          </a:xfrm>
-        </p:spPr>
-        <p:txBody>
-          <a:bodyPr>
-            <a:normAutofit/>
-          </a:bodyPr>
-          <a:lstStyle/>
-          <a:p>
-            <a:pPr>
-              <a:lnSpc>
-                <a:spcPct val="115000"/>
-              </a:lnSpc>
-            </a:pPr>
-            <a:r>
-              <a:rPr lang="en-US" sz="2000" dirty="0"/>
-              <a:t>Number of medical encounters</a:t>
-            </a:r>
-          </a:p>
-          <a:p>
-            <a:pPr>
-              <a:lnSpc>
-                <a:spcPct val="115000"/>
-              </a:lnSpc>
-            </a:pPr>
-            <a:r>
-              <a:rPr lang="en-US" sz="2000" dirty="0"/>
-              <a:t>Number of medical procedures</a:t>
-            </a:r>
-          </a:p>
-          <a:p>
-            <a:pPr>
-              <a:lnSpc>
-                <a:spcPct val="115000"/>
-              </a:lnSpc>
-            </a:pPr>
-            <a:r>
-              <a:rPr lang="en-US" sz="2000" dirty="0"/>
-              <a:t>DALY </a:t>
-            </a:r>
-            <a:r>
-              <a:rPr lang="en-US" sz="2000" dirty="0">
-                <a:effectLst/>
-                <a:ea typeface="Aptos" panose="020B0004020202020204" pitchFamily="34" charset="0"/>
-                <a:cs typeface="Times New Roman" panose="02020603050405020304" pitchFamily="18" charset="0"/>
-              </a:rPr>
-              <a:t>(disability-adjusted life year</a:t>
-            </a:r>
-          </a:p>
-          <a:p>
-            <a:pPr>
-              <a:lnSpc>
-                <a:spcPct val="115000"/>
-              </a:lnSpc>
-            </a:pPr>
-            <a:r>
-              <a:rPr lang="en-US" sz="2000" dirty="0"/>
-              <a:t>Body mass index (BMI)</a:t>
-            </a:r>
-          </a:p>
-          <a:p>
-            <a:pPr>
-              <a:lnSpc>
-                <a:spcPct val="115000"/>
-              </a:lnSpc>
-            </a:pPr>
-            <a:r>
-              <a:rPr lang="en-US" sz="2000" dirty="0"/>
-              <a:t>Pain severity - 0-10 verbal numeric rating</a:t>
-            </a:r>
-          </a:p>
-          <a:p>
-            <a:pPr>
-              <a:lnSpc>
-                <a:spcPct val="115000"/>
-              </a:lnSpc>
-            </a:pPr>
-            <a:r>
-              <a:rPr lang="en-US" sz="2000" dirty="0"/>
-              <a:t>Age</a:t>
-            </a:r>
-          </a:p>
-          <a:p>
-            <a:pPr>
-              <a:lnSpc>
-                <a:spcPct val="115000"/>
-              </a:lnSpc>
-            </a:pPr>
-            <a:r>
-              <a:rPr lang="en-US" sz="2000" dirty="0"/>
-              <a:t>Medications cost</a:t>
-            </a:r>
-          </a:p>
-          <a:p>
-            <a:pPr>
-              <a:lnSpc>
-                <a:spcPct val="115000"/>
-              </a:lnSpc>
-            </a:pPr>
-            <a:r>
-              <a:rPr lang="en-US" sz="2000" dirty="0"/>
-              <a:t>Cholesterol in HDL [Mass/volume]</a:t>
-            </a:r>
-          </a:p>
-          <a:p>
-            <a:pPr>
-              <a:lnSpc>
-                <a:spcPct val="115000"/>
-              </a:lnSpc>
-            </a:pPr>
-            <a:r>
-              <a:rPr lang="en-US" sz="2000" dirty="0"/>
-              <a:t>Number of medications</a:t>
-            </a:r>
-          </a:p>
-        </p:txBody>
-      </p:sp>
       <p:sp>
         <p:nvSpPr>
           <p:cNvPr id="2" name="Title 1">
             <a:extLst>
               <a:ext uri="{FF2B5EF4-FFF2-40B4-BE49-F238E27FC236}">
-                <a16:creationId xmlns:a16="http://schemas.microsoft.com/office/drawing/2014/main" id="{FEFE919D-EE76-8309-D154-BC079BFB47B0}"/>
+                <a16:creationId xmlns:a16="http://schemas.microsoft.com/office/drawing/2014/main" id="{08613A0E-F225-3964-93F5-35708484FC30}"/>
               </a:ext>
             </a:extLst>
           </p:cNvPr>
@@ -7521,8 +7047,41 @@
         </p:nvSpPr>
         <p:spPr>
           <a:xfrm>
-            <a:off x="5838824" y="276225"/>
-            <a:ext cx="5981701" cy="1524000"/>
+            <a:off x="762000" y="0"/>
+            <a:ext cx="10668000" cy="1524000"/>
+          </a:xfrm>
+        </p:spPr>
+        <p:txBody>
+          <a:bodyPr/>
+          <a:lstStyle/>
+          <a:p>
+            <a:r>
+              <a:rPr lang="en-US" dirty="0"/>
+              <a:t>Final Model Selection – Top Features</a:t>
+            </a:r>
+          </a:p>
+        </p:txBody>
+      </p:sp>
+      <p:sp>
+        <p:nvSpPr>
+          <p:cNvPr id="3" name="Content Placeholder 2">
+            <a:extLst>
+              <a:ext uri="{FF2B5EF4-FFF2-40B4-BE49-F238E27FC236}">
+                <a16:creationId xmlns:a16="http://schemas.microsoft.com/office/drawing/2014/main" id="{045DA9EE-C3BD-C0E5-FFC0-6D96CFBE4657}"/>
+              </a:ext>
+            </a:extLst>
+          </p:cNvPr>
+          <p:cNvSpPr>
+            <a:spLocks noGrp="1"/>
+          </p:cNvSpPr>
+          <p:nvPr>
+            <p:ph sz="half" idx="1"/>
+          </p:nvPr>
+        </p:nvSpPr>
+        <p:spPr>
+          <a:xfrm>
+            <a:off x="762002" y="1184786"/>
+            <a:ext cx="5151119" cy="4994788"/>
           </a:xfrm>
         </p:spPr>
         <p:txBody>
@@ -7531,9 +7090,384 @@
           </a:bodyPr>
           <a:lstStyle/>
           <a:p>
-            <a:r>
-              <a:rPr lang="en-US" dirty="0"/>
-              <a:t>Final Model Selection – Top Features</a:t>
+            <a:pPr marL="342900" marR="0" lvl="0" indent="-342900">
+              <a:lnSpc>
+                <a:spcPct val="115000"/>
+              </a:lnSpc>
+              <a:buFont typeface="+mj-lt"/>
+              <a:buAutoNum type="arabicPeriod"/>
+            </a:pPr>
+            <a:r>
+              <a:rPr lang="en-US" sz="1800" kern="100" dirty="0">
+                <a:ea typeface="Aptos" panose="020B0004020202020204" pitchFamily="34" charset="0"/>
+                <a:cs typeface="Times New Roman" panose="02020603050405020304" pitchFamily="18" charset="0"/>
+              </a:rPr>
+              <a:t>Number of medical encounters</a:t>
+            </a:r>
+            <a:endParaRPr lang="en-US" sz="1800" kern="100" dirty="0">
+              <a:effectLst/>
+              <a:ea typeface="Aptos" panose="020B0004020202020204" pitchFamily="34" charset="0"/>
+              <a:cs typeface="Times New Roman" panose="02020603050405020304" pitchFamily="18" charset="0"/>
+            </a:endParaRPr>
+          </a:p>
+          <a:p>
+            <a:pPr marL="342900" marR="0" lvl="0" indent="-342900">
+              <a:lnSpc>
+                <a:spcPct val="115000"/>
+              </a:lnSpc>
+              <a:buFont typeface="+mj-lt"/>
+              <a:buAutoNum type="arabicPeriod"/>
+            </a:pPr>
+            <a:r>
+              <a:rPr lang="en-US" sz="1800" kern="100" dirty="0">
+                <a:effectLst/>
+                <a:ea typeface="Aptos" panose="020B0004020202020204" pitchFamily="34" charset="0"/>
+                <a:cs typeface="Times New Roman" panose="02020603050405020304" pitchFamily="18" charset="0"/>
+              </a:rPr>
+              <a:t>Number of medical procedures</a:t>
+            </a:r>
+          </a:p>
+          <a:p>
+            <a:pPr marL="342900" marR="0" lvl="0" indent="-342900">
+              <a:lnSpc>
+                <a:spcPct val="115000"/>
+              </a:lnSpc>
+              <a:buFont typeface="+mj-lt"/>
+              <a:buAutoNum type="arabicPeriod"/>
+            </a:pPr>
+            <a:r>
+              <a:rPr lang="en-US" sz="1800" kern="100" dirty="0">
+                <a:effectLst/>
+                <a:ea typeface="Aptos" panose="020B0004020202020204" pitchFamily="34" charset="0"/>
+                <a:cs typeface="Times New Roman" panose="02020603050405020304" pitchFamily="18" charset="0"/>
+              </a:rPr>
+              <a:t>DALY (disability-adjusted life years)</a:t>
+            </a:r>
+          </a:p>
+          <a:p>
+            <a:pPr marL="342900" marR="0" lvl="0" indent="-342900">
+              <a:lnSpc>
+                <a:spcPct val="115000"/>
+              </a:lnSpc>
+              <a:buFont typeface="+mj-lt"/>
+              <a:buAutoNum type="arabicPeriod"/>
+            </a:pPr>
+            <a:r>
+              <a:rPr lang="en-US" sz="1800" kern="100" dirty="0">
+                <a:effectLst/>
+                <a:ea typeface="Aptos" panose="020B0004020202020204" pitchFamily="34" charset="0"/>
+                <a:cs typeface="Times New Roman" panose="02020603050405020304" pitchFamily="18" charset="0"/>
+              </a:rPr>
+              <a:t>Glomerular filtration rate/1.73 sq M</a:t>
+            </a:r>
+          </a:p>
+          <a:p>
+            <a:pPr marL="342900" marR="0" lvl="0" indent="-342900">
+              <a:lnSpc>
+                <a:spcPct val="115000"/>
+              </a:lnSpc>
+              <a:buFont typeface="+mj-lt"/>
+              <a:buAutoNum type="arabicPeriod"/>
+            </a:pPr>
+            <a:r>
+              <a:rPr lang="en-US" sz="1800" kern="100" dirty="0">
+                <a:effectLst/>
+                <a:ea typeface="Aptos" panose="020B0004020202020204" pitchFamily="34" charset="0"/>
+                <a:cs typeface="Times New Roman" panose="02020603050405020304" pitchFamily="18" charset="0"/>
+              </a:rPr>
+              <a:t>Leukocytes [#/volume] in Blood</a:t>
+            </a:r>
+          </a:p>
+          <a:p>
+            <a:pPr marL="342900" marR="0" lvl="0" indent="-342900">
+              <a:lnSpc>
+                <a:spcPct val="115000"/>
+              </a:lnSpc>
+              <a:buFont typeface="+mj-lt"/>
+              <a:buAutoNum type="arabicPeriod"/>
+            </a:pPr>
+            <a:r>
+              <a:rPr lang="en-US" sz="1800" kern="100" dirty="0">
+                <a:effectLst/>
+                <a:ea typeface="Aptos" panose="020B0004020202020204" pitchFamily="34" charset="0"/>
+                <a:cs typeface="Times New Roman" panose="02020603050405020304" pitchFamily="18" charset="0"/>
+              </a:rPr>
+              <a:t>Hematocrit [Volume Fraction] of Blood</a:t>
+            </a:r>
+          </a:p>
+          <a:p>
+            <a:pPr marL="342900" marR="0" lvl="0" indent="-342900">
+              <a:lnSpc>
+                <a:spcPct val="115000"/>
+              </a:lnSpc>
+              <a:buFont typeface="+mj-lt"/>
+              <a:buAutoNum type="arabicPeriod"/>
+            </a:pPr>
+            <a:r>
+              <a:rPr lang="en-US" sz="1800" kern="100" dirty="0">
+                <a:effectLst/>
+                <a:ea typeface="Aptos" panose="020B0004020202020204" pitchFamily="34" charset="0"/>
+                <a:cs typeface="Times New Roman" panose="02020603050405020304" pitchFamily="18" charset="0"/>
+              </a:rPr>
+              <a:t>Body mass index (BMI) </a:t>
+            </a:r>
+          </a:p>
+          <a:p>
+            <a:pPr marL="342900" marR="0" lvl="0" indent="-342900">
+              <a:lnSpc>
+                <a:spcPct val="115000"/>
+              </a:lnSpc>
+              <a:buFont typeface="+mj-lt"/>
+              <a:buAutoNum type="arabicPeriod"/>
+            </a:pPr>
+            <a:r>
+              <a:rPr lang="en-US" sz="1800" kern="100" dirty="0">
+                <a:effectLst/>
+                <a:ea typeface="Aptos" panose="020B0004020202020204" pitchFamily="34" charset="0"/>
+                <a:cs typeface="Times New Roman" panose="02020603050405020304" pitchFamily="18" charset="0"/>
+              </a:rPr>
+              <a:t>Pain severity - 0-10</a:t>
+            </a:r>
+          </a:p>
+          <a:p>
+            <a:pPr marL="342900" marR="0" lvl="0" indent="-342900">
+              <a:lnSpc>
+                <a:spcPct val="115000"/>
+              </a:lnSpc>
+              <a:buFont typeface="+mj-lt"/>
+              <a:buAutoNum type="arabicPeriod"/>
+            </a:pPr>
+            <a:r>
+              <a:rPr lang="en-US" sz="1800" kern="100" dirty="0">
+                <a:effectLst/>
+                <a:ea typeface="Aptos" panose="020B0004020202020204" pitchFamily="34" charset="0"/>
+                <a:cs typeface="Times New Roman" panose="02020603050405020304" pitchFamily="18" charset="0"/>
+              </a:rPr>
+              <a:t>Age</a:t>
+            </a:r>
+          </a:p>
+          <a:p>
+            <a:pPr marL="342900" marR="0" lvl="0" indent="-342900">
+              <a:lnSpc>
+                <a:spcPct val="115000"/>
+              </a:lnSpc>
+              <a:buFont typeface="+mj-lt"/>
+              <a:buAutoNum type="arabicPeriod"/>
+            </a:pPr>
+            <a:r>
+              <a:rPr lang="en-US" sz="1800" kern="100" dirty="0">
+                <a:effectLst/>
+                <a:ea typeface="Aptos" panose="020B0004020202020204" pitchFamily="34" charset="0"/>
+                <a:cs typeface="Times New Roman" panose="02020603050405020304" pitchFamily="18" charset="0"/>
+              </a:rPr>
+              <a:t>Cost of medications</a:t>
+            </a:r>
+          </a:p>
+        </p:txBody>
+      </p:sp>
+      <p:sp>
+        <p:nvSpPr>
+          <p:cNvPr id="4" name="Content Placeholder 3">
+            <a:extLst>
+              <a:ext uri="{FF2B5EF4-FFF2-40B4-BE49-F238E27FC236}">
+                <a16:creationId xmlns:a16="http://schemas.microsoft.com/office/drawing/2014/main" id="{77DE91B4-22EE-A100-C8B7-5D27EE137BEB}"/>
+              </a:ext>
+            </a:extLst>
+          </p:cNvPr>
+          <p:cNvSpPr>
+            <a:spLocks noGrp="1"/>
+          </p:cNvSpPr>
+          <p:nvPr>
+            <p:ph sz="half" idx="2"/>
+          </p:nvPr>
+        </p:nvSpPr>
+        <p:spPr>
+          <a:xfrm>
+            <a:off x="6278880" y="1184786"/>
+            <a:ext cx="5151121" cy="4994788"/>
+          </a:xfrm>
+        </p:spPr>
+        <p:txBody>
+          <a:bodyPr>
+            <a:noAutofit/>
+          </a:bodyPr>
+          <a:lstStyle/>
+          <a:p>
+            <a:pPr marL="514350" marR="0" lvl="0" indent="-514350">
+              <a:lnSpc>
+                <a:spcPct val="115000"/>
+              </a:lnSpc>
+              <a:buFont typeface="+mj-lt"/>
+              <a:buAutoNum type="arabicPeriod" startAt="11"/>
+            </a:pPr>
+            <a:r>
+              <a:rPr lang="en-US" sz="1800" kern="100" dirty="0">
+                <a:effectLst/>
+                <a:ea typeface="Aptos" panose="020B0004020202020204" pitchFamily="34" charset="0"/>
+                <a:cs typeface="Times New Roman" panose="02020603050405020304" pitchFamily="18" charset="0"/>
+              </a:rPr>
+              <a:t>Urea nitrogen [Mass/volume] in Blood</a:t>
+            </a:r>
+          </a:p>
+          <a:p>
+            <a:pPr marL="514350" marR="0" lvl="0" indent="-514350">
+              <a:lnSpc>
+                <a:spcPct val="115000"/>
+              </a:lnSpc>
+              <a:buFont typeface="+mj-lt"/>
+              <a:buAutoNum type="arabicPeriod" startAt="11"/>
+            </a:pPr>
+            <a:r>
+              <a:rPr lang="en-US" sz="1800" kern="100" dirty="0">
+                <a:effectLst/>
+                <a:ea typeface="Aptos" panose="020B0004020202020204" pitchFamily="34" charset="0"/>
+                <a:cs typeface="Times New Roman" panose="02020603050405020304" pitchFamily="18" charset="0"/>
+              </a:rPr>
+              <a:t>Chloride [Moles/volume] in Blood</a:t>
+            </a:r>
+          </a:p>
+          <a:p>
+            <a:pPr marL="514350" marR="0" lvl="0" indent="-514350">
+              <a:lnSpc>
+                <a:spcPct val="115000"/>
+              </a:lnSpc>
+              <a:buFont typeface="+mj-lt"/>
+              <a:buAutoNum type="arabicPeriod" startAt="11"/>
+            </a:pPr>
+            <a:r>
+              <a:rPr lang="en-US" sz="1800" kern="100" dirty="0">
+                <a:effectLst/>
+                <a:ea typeface="Aptos" panose="020B0004020202020204" pitchFamily="34" charset="0"/>
+                <a:cs typeface="Times New Roman" panose="02020603050405020304" pitchFamily="18" charset="0"/>
+              </a:rPr>
+              <a:t>Cholesterol in HDL [Mass/volume] in Serum or Plasma</a:t>
+            </a:r>
+          </a:p>
+          <a:p>
+            <a:pPr marL="514350" marR="0" lvl="0" indent="-514350">
+              <a:lnSpc>
+                <a:spcPct val="115000"/>
+              </a:lnSpc>
+              <a:buFont typeface="+mj-lt"/>
+              <a:buAutoNum type="arabicPeriod" startAt="11"/>
+            </a:pPr>
+            <a:r>
+              <a:rPr lang="en-US" sz="1800" kern="100" dirty="0">
+                <a:effectLst/>
+                <a:ea typeface="Aptos" panose="020B0004020202020204" pitchFamily="34" charset="0"/>
+                <a:cs typeface="Times New Roman" panose="02020603050405020304" pitchFamily="18" charset="0"/>
+              </a:rPr>
+              <a:t>Potassium [Moles/volume] in Blood</a:t>
+            </a:r>
+          </a:p>
+          <a:p>
+            <a:pPr marL="514350" marR="0" lvl="0" indent="-514350">
+              <a:lnSpc>
+                <a:spcPct val="115000"/>
+              </a:lnSpc>
+              <a:buFont typeface="+mj-lt"/>
+              <a:buAutoNum type="arabicPeriod" startAt="11"/>
+            </a:pPr>
+            <a:r>
+              <a:rPr lang="en-US" sz="1800" kern="100" dirty="0">
+                <a:effectLst/>
+                <a:ea typeface="Aptos" panose="020B0004020202020204" pitchFamily="34" charset="0"/>
+                <a:cs typeface="Times New Roman" panose="02020603050405020304" pitchFamily="18" charset="0"/>
+              </a:rPr>
+              <a:t>Number of medications</a:t>
+            </a:r>
+            <a:endParaRPr lang="en-US" sz="1800" kern="100" dirty="0">
+              <a:ea typeface="Aptos" panose="020B0004020202020204" pitchFamily="34" charset="0"/>
+              <a:cs typeface="Times New Roman" panose="02020603050405020304" pitchFamily="18" charset="0"/>
+            </a:endParaRPr>
+          </a:p>
+          <a:p>
+            <a:pPr marL="514350" marR="0" lvl="0" indent="-514350">
+              <a:lnSpc>
+                <a:spcPct val="115000"/>
+              </a:lnSpc>
+              <a:buFont typeface="+mj-lt"/>
+              <a:buAutoNum type="arabicPeriod" startAt="11"/>
+            </a:pPr>
+            <a:r>
+              <a:rPr lang="en-US" sz="1800" kern="100" dirty="0">
+                <a:effectLst/>
+                <a:ea typeface="Aptos" panose="020B0004020202020204" pitchFamily="34" charset="0"/>
+                <a:cs typeface="Times New Roman" panose="02020603050405020304" pitchFamily="18" charset="0"/>
+              </a:rPr>
+              <a:t>Triglycerides</a:t>
+            </a:r>
+            <a:endParaRPr lang="en-US" sz="1800" kern="100" dirty="0">
+              <a:ea typeface="Aptos" panose="020B0004020202020204" pitchFamily="34" charset="0"/>
+              <a:cs typeface="Times New Roman" panose="02020603050405020304" pitchFamily="18" charset="0"/>
+            </a:endParaRPr>
+          </a:p>
+          <a:p>
+            <a:pPr marL="514350" marR="0" lvl="0" indent="-514350">
+              <a:lnSpc>
+                <a:spcPct val="115000"/>
+              </a:lnSpc>
+              <a:buFont typeface="+mj-lt"/>
+              <a:buAutoNum type="arabicPeriod" startAt="11"/>
+            </a:pPr>
+            <a:r>
+              <a:rPr lang="en-US" sz="1800" kern="100" dirty="0">
+                <a:effectLst/>
+                <a:ea typeface="Aptos" panose="020B0004020202020204" pitchFamily="34" charset="0"/>
+                <a:cs typeface="Times New Roman" panose="02020603050405020304" pitchFamily="18" charset="0"/>
+              </a:rPr>
+              <a:t>Carbon dioxide  total [Moles/volume] in Blood</a:t>
+            </a:r>
+          </a:p>
+          <a:p>
+            <a:pPr marL="514350" marR="0" lvl="0" indent="-514350">
+              <a:lnSpc>
+                <a:spcPct val="115000"/>
+              </a:lnSpc>
+              <a:buFont typeface="+mj-lt"/>
+              <a:buAutoNum type="arabicPeriod" startAt="11"/>
+            </a:pPr>
+            <a:r>
+              <a:rPr lang="en-US" sz="1800" kern="100" dirty="0">
+                <a:effectLst/>
+                <a:ea typeface="Aptos" panose="020B0004020202020204" pitchFamily="34" charset="0"/>
+                <a:cs typeface="Times New Roman" panose="02020603050405020304" pitchFamily="18" charset="0"/>
+              </a:rPr>
+              <a:t>QALY (quality adjusted life years)</a:t>
+            </a:r>
+          </a:p>
+          <a:p>
+            <a:pPr marL="514350" marR="0" lvl="0" indent="-514350">
+              <a:lnSpc>
+                <a:spcPct val="115000"/>
+              </a:lnSpc>
+              <a:buFont typeface="+mj-lt"/>
+              <a:buAutoNum type="arabicPeriod" startAt="11"/>
+            </a:pPr>
+            <a:r>
+              <a:rPr lang="en-US" sz="1800" kern="100" dirty="0">
+                <a:effectLst/>
+                <a:ea typeface="Aptos" panose="020B0004020202020204" pitchFamily="34" charset="0"/>
+                <a:cs typeface="Times New Roman" panose="02020603050405020304" pitchFamily="18" charset="0"/>
+              </a:rPr>
+              <a:t>Creatinine [Mass/volume] in Blood</a:t>
+            </a:r>
+          </a:p>
+          <a:p>
+            <a:pPr marL="514350" marR="0" lvl="0" indent="-514350">
+              <a:lnSpc>
+                <a:spcPct val="115000"/>
+              </a:lnSpc>
+              <a:buFont typeface="+mj-lt"/>
+              <a:buAutoNum type="arabicPeriod" startAt="11"/>
+            </a:pPr>
+            <a:r>
+              <a:rPr lang="en-US" sz="1800" kern="100" dirty="0">
+                <a:effectLst/>
+                <a:ea typeface="Aptos" panose="020B0004020202020204" pitchFamily="34" charset="0"/>
+                <a:cs typeface="Times New Roman" panose="02020603050405020304" pitchFamily="18" charset="0"/>
+              </a:rPr>
+              <a:t>State population</a:t>
             </a:r>
           </a:p>
         </p:txBody>
@@ -7541,7 +7475,7 @@
     </p:spTree>
     <p:extLst>
       <p:ext uri="{BB962C8B-B14F-4D97-AF65-F5344CB8AC3E}">
-        <p14:creationId xmlns:p14="http://schemas.microsoft.com/office/powerpoint/2010/main" val="1094042878"/>
+        <p14:creationId xmlns:p14="http://schemas.microsoft.com/office/powerpoint/2010/main" val="4091710249"/>
       </p:ext>
     </p:extLst>
   </p:cSld>
@@ -7990,7 +7924,7 @@
                 <a:ea typeface="Aptos" panose="020B0004020202020204" pitchFamily="34" charset="0"/>
                 <a:cs typeface="Times New Roman" panose="02020603050405020304" pitchFamily="18" charset="0"/>
               </a:rPr>
-              <a:t>n average, this model is expected to estimate a patient's yearly medical encounters cost within about $2,500</a:t>
+              <a:t>n average, this model is expected to estimate a patient's yearly medical encounters cost within about $6,500</a:t>
             </a:r>
           </a:p>
           <a:p>

</xml_diff>

<commit_message>
Updated list of feature importance
</commit_message>
<xml_diff>
--- a/docs/Synthea Capstone Project Presentation.pptx
+++ b/docs/Synthea Capstone Project Presentation.pptx
@@ -7080,8 +7080,8 @@
         </p:nvSpPr>
         <p:spPr>
           <a:xfrm>
-            <a:off x="762002" y="1184786"/>
-            <a:ext cx="5151119" cy="4994788"/>
+            <a:off x="378542" y="1184786"/>
+            <a:ext cx="5913120" cy="4994788"/>
           </a:xfrm>
         </p:spPr>
         <p:txBody>
@@ -7099,16 +7099,12 @@
             </a:pPr>
             <a:r>
               <a:rPr lang="en-US" sz="1800" kern="100" dirty="0">
+                <a:effectLst/>
                 <a:ea typeface="Aptos" panose="020B0004020202020204" pitchFamily="34" charset="0"/>
                 <a:cs typeface="Times New Roman" panose="02020603050405020304" pitchFamily="18" charset="0"/>
               </a:rPr>
               <a:t>Number of medical encounters</a:t>
             </a:r>
-            <a:endParaRPr lang="en-US" sz="1800" kern="100" dirty="0">
-              <a:effectLst/>
-              <a:ea typeface="Aptos" panose="020B0004020202020204" pitchFamily="34" charset="0"/>
-              <a:cs typeface="Times New Roman" panose="02020603050405020304" pitchFamily="18" charset="0"/>
-            </a:endParaRPr>
           </a:p>
           <a:p>
             <a:pPr marL="342900" marR="0" lvl="0" indent="-342900">
@@ -7158,7 +7154,7 @@
                 <a:ea typeface="Aptos" panose="020B0004020202020204" pitchFamily="34" charset="0"/>
                 <a:cs typeface="Times New Roman" panose="02020603050405020304" pitchFamily="18" charset="0"/>
               </a:rPr>
-              <a:t>Glomerular filtration rate/1.73 sq M</a:t>
+              <a:t>Leukocytes [#/volume] in Blood</a:t>
             </a:r>
           </a:p>
           <a:p>
@@ -7175,7 +7171,23 @@
                 <a:ea typeface="Aptos" panose="020B0004020202020204" pitchFamily="34" charset="0"/>
                 <a:cs typeface="Times New Roman" panose="02020603050405020304" pitchFamily="18" charset="0"/>
               </a:rPr>
-              <a:t>Leukocytes [#/volume] in Blood</a:t>
+              <a:t>Glomerular filtration rate/1.73 sq </a:t>
+            </a:r>
+            <a:r>
+              <a:rPr lang="en-US" sz="1800" kern="100" dirty="0" err="1">
+                <a:effectLst/>
+                <a:ea typeface="Aptos" panose="020B0004020202020204" pitchFamily="34" charset="0"/>
+                <a:cs typeface="Times New Roman" panose="02020603050405020304" pitchFamily="18" charset="0"/>
+              </a:rPr>
+              <a:t>M.predicted</a:t>
+            </a:r>
+            <a:r>
+              <a:rPr lang="en-US" sz="1800" kern="100" dirty="0">
+                <a:effectLst/>
+                <a:ea typeface="Aptos" panose="020B0004020202020204" pitchFamily="34" charset="0"/>
+                <a:cs typeface="Times New Roman" panose="02020603050405020304" pitchFamily="18" charset="0"/>
+              </a:rPr>
+              <a:t> [Volume Rate/Area]</a:t>
             </a:r>
           </a:p>
           <a:p>
@@ -7192,7 +7204,7 @@
                 <a:ea typeface="Aptos" panose="020B0004020202020204" pitchFamily="34" charset="0"/>
                 <a:cs typeface="Times New Roman" panose="02020603050405020304" pitchFamily="18" charset="0"/>
               </a:rPr>
-              <a:t>Hematocrit [Volume Fraction] of Blood</a:t>
+              <a:t>Age</a:t>
             </a:r>
           </a:p>
           <a:p>
@@ -7209,7 +7221,7 @@
                 <a:ea typeface="Aptos" panose="020B0004020202020204" pitchFamily="34" charset="0"/>
                 <a:cs typeface="Times New Roman" panose="02020603050405020304" pitchFamily="18" charset="0"/>
               </a:rPr>
-              <a:t>Body mass index (BMI) </a:t>
+              <a:t>Chloride [Moles/volume] in Blood</a:t>
             </a:r>
           </a:p>
           <a:p>
@@ -7226,8 +7238,12 @@
                 <a:ea typeface="Aptos" panose="020B0004020202020204" pitchFamily="34" charset="0"/>
                 <a:cs typeface="Times New Roman" panose="02020603050405020304" pitchFamily="18" charset="0"/>
               </a:rPr>
-              <a:t>Pain severity - 0-10</a:t>
-            </a:r>
+              <a:t>Cost of medications</a:t>
+            </a:r>
+            <a:endParaRPr lang="en-US" sz="1800" kern="100" dirty="0">
+              <a:ea typeface="Aptos" panose="020B0004020202020204" pitchFamily="34" charset="0"/>
+              <a:cs typeface="Times New Roman" panose="02020603050405020304" pitchFamily="18" charset="0"/>
+            </a:endParaRPr>
           </a:p>
           <a:p>
             <a:pPr marL="342900" marR="0" lvl="0" indent="-342900">
@@ -7243,7 +7259,7 @@
                 <a:ea typeface="Aptos" panose="020B0004020202020204" pitchFamily="34" charset="0"/>
                 <a:cs typeface="Times New Roman" panose="02020603050405020304" pitchFamily="18" charset="0"/>
               </a:rPr>
-              <a:t>Age</a:t>
+              <a:t>Pain severity - 0-10</a:t>
             </a:r>
           </a:p>
           <a:p>
@@ -7256,12 +7272,30 @@
             </a:pPr>
             <a:r>
               <a:rPr lang="en-US" sz="1800" kern="100" dirty="0">
-                <a:effectLst/>
                 <a:ea typeface="Aptos" panose="020B0004020202020204" pitchFamily="34" charset="0"/>
                 <a:cs typeface="Times New Roman" panose="02020603050405020304" pitchFamily="18" charset="0"/>
               </a:rPr>
-              <a:t>Cost of medications</a:t>
-            </a:r>
+              <a:t>Number of medications</a:t>
+            </a:r>
+            <a:endParaRPr lang="en-US" sz="1800" kern="100" dirty="0">
+              <a:effectLst/>
+              <a:ea typeface="Aptos" panose="020B0004020202020204" pitchFamily="34" charset="0"/>
+              <a:cs typeface="Times New Roman" panose="02020603050405020304" pitchFamily="18" charset="0"/>
+            </a:endParaRPr>
+          </a:p>
+          <a:p>
+            <a:pPr marL="342900" marR="0" lvl="0" indent="-342900">
+              <a:lnSpc>
+                <a:spcPct val="115000"/>
+              </a:lnSpc>
+              <a:buFont typeface="+mj-lt"/>
+              <a:buAutoNum type="arabicPeriod"/>
+            </a:pPr>
+            <a:endParaRPr lang="en-US" sz="1800" kern="100" dirty="0">
+              <a:effectLst/>
+              <a:ea typeface="Aptos" panose="020B0004020202020204" pitchFamily="34" charset="0"/>
+              <a:cs typeface="Times New Roman" panose="02020603050405020304" pitchFamily="18" charset="0"/>
+            </a:endParaRPr>
           </a:p>
         </p:txBody>
       </p:sp>
@@ -7283,8 +7317,8 @@
         </p:nvSpPr>
         <p:spPr>
           <a:xfrm>
-            <a:off x="6278880" y="1184786"/>
-            <a:ext cx="5151121" cy="4994788"/>
+            <a:off x="6170726" y="1184786"/>
+            <a:ext cx="5913120" cy="4994788"/>
           </a:xfrm>
         </p:spPr>
         <p:txBody>
@@ -7292,6 +7326,207 @@
             <a:noAutofit/>
           </a:bodyPr>
           <a:lstStyle/>
+          <a:p>
+            <a:pPr marL="342900" marR="0" lvl="0" indent="-342900">
+              <a:lnSpc>
+                <a:spcPct val="115000"/>
+              </a:lnSpc>
+              <a:buFont typeface="+mj-lt"/>
+              <a:buAutoNum type="arabicPeriod" startAt="11"/>
+            </a:pPr>
+            <a:r>
+              <a:rPr lang="en-US" sz="1800" kern="100" dirty="0">
+                <a:effectLst/>
+                <a:latin typeface="Aptos" panose="020B0004020202020204" pitchFamily="34" charset="0"/>
+                <a:ea typeface="Aptos" panose="020B0004020202020204" pitchFamily="34" charset="0"/>
+                <a:cs typeface="Times New Roman" panose="02020603050405020304" pitchFamily="18" charset="0"/>
+              </a:rPr>
+              <a:t>QALY (quality-adjusted life years)</a:t>
+            </a:r>
+          </a:p>
+          <a:p>
+            <a:pPr marL="342900" marR="0" lvl="0" indent="-342900">
+              <a:lnSpc>
+                <a:spcPct val="115000"/>
+              </a:lnSpc>
+              <a:buFont typeface="+mj-lt"/>
+              <a:buAutoNum type="arabicPeriod" startAt="11"/>
+            </a:pPr>
+            <a:r>
+              <a:rPr lang="en-US" sz="1800" kern="100" dirty="0">
+                <a:effectLst/>
+                <a:latin typeface="Aptos" panose="020B0004020202020204" pitchFamily="34" charset="0"/>
+                <a:ea typeface="Aptos" panose="020B0004020202020204" pitchFamily="34" charset="0"/>
+                <a:cs typeface="Times New Roman" panose="02020603050405020304" pitchFamily="18" charset="0"/>
+              </a:rPr>
+              <a:t>Potassium [Moles/volume] in Blood</a:t>
+            </a:r>
+          </a:p>
+          <a:p>
+            <a:pPr marL="342900" marR="0" lvl="0" indent="-342900">
+              <a:lnSpc>
+                <a:spcPct val="115000"/>
+              </a:lnSpc>
+              <a:buFont typeface="+mj-lt"/>
+              <a:buAutoNum type="arabicPeriod" startAt="11"/>
+            </a:pPr>
+            <a:r>
+              <a:rPr lang="en-US" sz="1800" kern="100" dirty="0">
+                <a:effectLst/>
+                <a:latin typeface="Aptos" panose="020B0004020202020204" pitchFamily="34" charset="0"/>
+                <a:ea typeface="Aptos" panose="020B0004020202020204" pitchFamily="34" charset="0"/>
+                <a:cs typeface="Times New Roman" panose="02020603050405020304" pitchFamily="18" charset="0"/>
+              </a:rPr>
+              <a:t>Body temperature</a:t>
+            </a:r>
+          </a:p>
+          <a:p>
+            <a:pPr marL="342900" marR="0" lvl="0" indent="-342900">
+              <a:lnSpc>
+                <a:spcPct val="115000"/>
+              </a:lnSpc>
+              <a:buFont typeface="+mj-lt"/>
+              <a:buAutoNum type="arabicPeriod" startAt="11"/>
+            </a:pPr>
+            <a:r>
+              <a:rPr lang="en-US" sz="1800" kern="100" dirty="0">
+                <a:effectLst/>
+                <a:latin typeface="Aptos" panose="020B0004020202020204" pitchFamily="34" charset="0"/>
+                <a:ea typeface="Aptos" panose="020B0004020202020204" pitchFamily="34" charset="0"/>
+                <a:cs typeface="Times New Roman" panose="02020603050405020304" pitchFamily="18" charset="0"/>
+              </a:rPr>
+              <a:t>Body mass index (BMI) [Percentile] Per age and sex</a:t>
+            </a:r>
+          </a:p>
+          <a:p>
+            <a:pPr marL="342900" marR="0" lvl="0" indent="-342900">
+              <a:lnSpc>
+                <a:spcPct val="115000"/>
+              </a:lnSpc>
+              <a:buFont typeface="+mj-lt"/>
+              <a:buAutoNum type="arabicPeriod" startAt="11"/>
+            </a:pPr>
+            <a:r>
+              <a:rPr lang="en-US" sz="1800" kern="100" dirty="0">
+                <a:effectLst/>
+                <a:latin typeface="Aptos" panose="020B0004020202020204" pitchFamily="34" charset="0"/>
+                <a:ea typeface="Aptos" panose="020B0004020202020204" pitchFamily="34" charset="0"/>
+                <a:cs typeface="Times New Roman" panose="02020603050405020304" pitchFamily="18" charset="0"/>
+              </a:rPr>
+              <a:t>Carbon dioxide  total [Moles/volume] in Blood</a:t>
+            </a:r>
+          </a:p>
+          <a:p>
+            <a:pPr marL="342900" marR="0" lvl="0" indent="-342900">
+              <a:lnSpc>
+                <a:spcPct val="115000"/>
+              </a:lnSpc>
+              <a:buFont typeface="+mj-lt"/>
+              <a:buAutoNum type="arabicPeriod" startAt="11"/>
+            </a:pPr>
+            <a:r>
+              <a:rPr lang="en-US" sz="1800" kern="100" dirty="0">
+                <a:effectLst/>
+                <a:latin typeface="Aptos" panose="020B0004020202020204" pitchFamily="34" charset="0"/>
+                <a:ea typeface="Aptos" panose="020B0004020202020204" pitchFamily="34" charset="0"/>
+                <a:cs typeface="Times New Roman" panose="02020603050405020304" pitchFamily="18" charset="0"/>
+              </a:rPr>
+              <a:t>Generalized anxiety disorder 7 item (GAD-7) total score [</a:t>
+            </a:r>
+            <a:r>
+              <a:rPr lang="en-US" sz="1800" kern="100" dirty="0" err="1">
+                <a:effectLst/>
+                <a:latin typeface="Aptos" panose="020B0004020202020204" pitchFamily="34" charset="0"/>
+                <a:ea typeface="Aptos" panose="020B0004020202020204" pitchFamily="34" charset="0"/>
+                <a:cs typeface="Times New Roman" panose="02020603050405020304" pitchFamily="18" charset="0"/>
+              </a:rPr>
+              <a:t>Reported.PHQ</a:t>
+            </a:r>
+            <a:r>
+              <a:rPr lang="en-US" sz="1800" kern="100" dirty="0">
+                <a:effectLst/>
+                <a:latin typeface="Aptos" panose="020B0004020202020204" pitchFamily="34" charset="0"/>
+                <a:ea typeface="Aptos" panose="020B0004020202020204" pitchFamily="34" charset="0"/>
+                <a:cs typeface="Times New Roman" panose="02020603050405020304" pitchFamily="18" charset="0"/>
+              </a:rPr>
+              <a:t>]</a:t>
+            </a:r>
+          </a:p>
+          <a:p>
+            <a:pPr marL="342900" marR="0" lvl="0" indent="-342900">
+              <a:lnSpc>
+                <a:spcPct val="115000"/>
+              </a:lnSpc>
+              <a:buFont typeface="+mj-lt"/>
+              <a:buAutoNum type="arabicPeriod" startAt="11"/>
+            </a:pPr>
+            <a:r>
+              <a:rPr lang="en-US" sz="1800" kern="100" dirty="0">
+                <a:effectLst/>
+                <a:latin typeface="Aptos" panose="020B0004020202020204" pitchFamily="34" charset="0"/>
+                <a:ea typeface="Aptos" panose="020B0004020202020204" pitchFamily="34" charset="0"/>
+                <a:cs typeface="Times New Roman" panose="02020603050405020304" pitchFamily="18" charset="0"/>
+              </a:rPr>
+              <a:t>State population</a:t>
+            </a:r>
+          </a:p>
+          <a:p>
+            <a:pPr marL="342900" marR="0" lvl="0" indent="-342900">
+              <a:lnSpc>
+                <a:spcPct val="115000"/>
+              </a:lnSpc>
+              <a:buFont typeface="+mj-lt"/>
+              <a:buAutoNum type="arabicPeriod" startAt="11"/>
+            </a:pPr>
+            <a:r>
+              <a:rPr lang="en-US" sz="1800" kern="100" dirty="0">
+                <a:effectLst/>
+                <a:latin typeface="Aptos" panose="020B0004020202020204" pitchFamily="34" charset="0"/>
+                <a:ea typeface="Aptos" panose="020B0004020202020204" pitchFamily="34" charset="0"/>
+                <a:cs typeface="Times New Roman" panose="02020603050405020304" pitchFamily="18" charset="0"/>
+              </a:rPr>
+              <a:t>Hemoglobin [Mass/volume] in Blood</a:t>
+            </a:r>
+          </a:p>
+          <a:p>
+            <a:pPr marL="342900" marR="0" lvl="0" indent="-342900">
+              <a:lnSpc>
+                <a:spcPct val="115000"/>
+              </a:lnSpc>
+              <a:buFont typeface="+mj-lt"/>
+              <a:buAutoNum type="arabicPeriod" startAt="11"/>
+            </a:pPr>
+            <a:r>
+              <a:rPr lang="en-US" sz="1800" kern="100" dirty="0">
+                <a:effectLst/>
+                <a:latin typeface="Aptos" panose="020B0004020202020204" pitchFamily="34" charset="0"/>
+                <a:ea typeface="Aptos" panose="020B0004020202020204" pitchFamily="34" charset="0"/>
+                <a:cs typeface="Times New Roman" panose="02020603050405020304" pitchFamily="18" charset="0"/>
+              </a:rPr>
+              <a:t>Cholesterol in HDL [Mass/volume] in Serum or Plasma</a:t>
+            </a:r>
+          </a:p>
+          <a:p>
+            <a:pPr marL="342900" marR="0" lvl="0" indent="-342900">
+              <a:lnSpc>
+                <a:spcPct val="115000"/>
+              </a:lnSpc>
+              <a:spcAft>
+                <a:spcPts val="800"/>
+              </a:spcAft>
+              <a:buFont typeface="+mj-lt"/>
+              <a:buAutoNum type="arabicPeriod" startAt="11"/>
+            </a:pPr>
+            <a:r>
+              <a:rPr lang="en-US" sz="1800" kern="100" dirty="0">
+                <a:effectLst/>
+                <a:latin typeface="Aptos" panose="020B0004020202020204" pitchFamily="34" charset="0"/>
+                <a:ea typeface="Aptos" panose="020B0004020202020204" pitchFamily="34" charset="0"/>
+                <a:cs typeface="Times New Roman" panose="02020603050405020304" pitchFamily="18" charset="0"/>
+              </a:rPr>
+              <a:t>Urea nitrogen [Mass/volume] in Blood</a:t>
+            </a:r>
+          </a:p>
           <a:p>
             <a:pPr marL="514350" marR="0" lvl="0" indent="-514350">
               <a:lnSpc>
@@ -7300,175 +7535,11 @@
               <a:buFont typeface="+mj-lt"/>
               <a:buAutoNum type="arabicPeriod" startAt="11"/>
             </a:pPr>
-            <a:r>
-              <a:rPr lang="en-US" sz="1800" kern="100" dirty="0">
-                <a:effectLst/>
-                <a:ea typeface="Aptos" panose="020B0004020202020204" pitchFamily="34" charset="0"/>
-                <a:cs typeface="Times New Roman" panose="02020603050405020304" pitchFamily="18" charset="0"/>
-              </a:rPr>
-              <a:t>Urea nitrogen [Mass/volume] in Blood</a:t>
-            </a:r>
-          </a:p>
-          <a:p>
-            <a:pPr marL="514350" marR="0" lvl="0" indent="-514350">
-              <a:lnSpc>
-                <a:spcPct val="115000"/>
-              </a:lnSpc>
-              <a:buFont typeface="+mj-lt"/>
-              <a:buAutoNum type="arabicPeriod" startAt="11"/>
-            </a:pPr>
-            <a:r>
-              <a:rPr lang="en-US" sz="1800" kern="100" dirty="0">
-                <a:effectLst/>
-                <a:ea typeface="Aptos" panose="020B0004020202020204" pitchFamily="34" charset="0"/>
-                <a:cs typeface="Times New Roman" panose="02020603050405020304" pitchFamily="18" charset="0"/>
-              </a:rPr>
-              <a:t>Chloride [Moles/volume] in Blood</a:t>
-            </a:r>
-          </a:p>
-          <a:p>
-            <a:pPr marL="514350" marR="0" lvl="0" indent="-514350">
-              <a:lnSpc>
-                <a:spcPct val="115000"/>
-              </a:lnSpc>
-              <a:buFont typeface="+mj-lt"/>
-              <a:buAutoNum type="arabicPeriod" startAt="11"/>
-            </a:pPr>
-            <a:r>
-              <a:rPr lang="en-US" sz="1800" kern="100" dirty="0">
-                <a:effectLst/>
-                <a:ea typeface="Aptos" panose="020B0004020202020204" pitchFamily="34" charset="0"/>
-                <a:cs typeface="Times New Roman" panose="02020603050405020304" pitchFamily="18" charset="0"/>
-              </a:rPr>
-              <a:t>Cholesterol in HDL [Mass/volume] in Serum or Plasma</a:t>
-            </a:r>
-          </a:p>
-          <a:p>
-            <a:pPr marL="514350" marR="0" lvl="0" indent="-514350">
-              <a:lnSpc>
-                <a:spcPct val="115000"/>
-              </a:lnSpc>
-              <a:buFont typeface="+mj-lt"/>
-              <a:buAutoNum type="arabicPeriod" startAt="11"/>
-            </a:pPr>
-            <a:r>
-              <a:rPr lang="en-US" sz="1800" kern="100" dirty="0">
-                <a:effectLst/>
-                <a:ea typeface="Aptos" panose="020B0004020202020204" pitchFamily="34" charset="0"/>
-                <a:cs typeface="Times New Roman" panose="02020603050405020304" pitchFamily="18" charset="0"/>
-              </a:rPr>
-              <a:t>Potassium [Moles/volume] in Blood</a:t>
-            </a:r>
-          </a:p>
-          <a:p>
-            <a:pPr marL="514350" marR="0" lvl="0" indent="-514350">
-              <a:lnSpc>
-                <a:spcPct val="115000"/>
-              </a:lnSpc>
-              <a:buFont typeface="+mj-lt"/>
-              <a:buAutoNum type="arabicPeriod" startAt="11"/>
-            </a:pPr>
-            <a:r>
-              <a:rPr lang="en-US" sz="1800" kern="100" dirty="0">
-                <a:effectLst/>
-                <a:ea typeface="Aptos" panose="020B0004020202020204" pitchFamily="34" charset="0"/>
-                <a:cs typeface="Times New Roman" panose="02020603050405020304" pitchFamily="18" charset="0"/>
-              </a:rPr>
-              <a:t>Number of medications</a:t>
-            </a:r>
             <a:endParaRPr lang="en-US" sz="1800" kern="100" dirty="0">
+              <a:effectLst/>
               <a:ea typeface="Aptos" panose="020B0004020202020204" pitchFamily="34" charset="0"/>
               <a:cs typeface="Times New Roman" panose="02020603050405020304" pitchFamily="18" charset="0"/>
             </a:endParaRPr>
-          </a:p>
-          <a:p>
-            <a:pPr marL="514350" marR="0" lvl="0" indent="-514350">
-              <a:lnSpc>
-                <a:spcPct val="115000"/>
-              </a:lnSpc>
-              <a:buFont typeface="+mj-lt"/>
-              <a:buAutoNum type="arabicPeriod" startAt="11"/>
-            </a:pPr>
-            <a:r>
-              <a:rPr lang="en-US" sz="1800" kern="100" dirty="0">
-                <a:effectLst/>
-                <a:ea typeface="Aptos" panose="020B0004020202020204" pitchFamily="34" charset="0"/>
-                <a:cs typeface="Times New Roman" panose="02020603050405020304" pitchFamily="18" charset="0"/>
-              </a:rPr>
-              <a:t>Triglycerides</a:t>
-            </a:r>
-            <a:endParaRPr lang="en-US" sz="1800" kern="100" dirty="0">
-              <a:ea typeface="Aptos" panose="020B0004020202020204" pitchFamily="34" charset="0"/>
-              <a:cs typeface="Times New Roman" panose="02020603050405020304" pitchFamily="18" charset="0"/>
-            </a:endParaRPr>
-          </a:p>
-          <a:p>
-            <a:pPr marL="514350" marR="0" lvl="0" indent="-514350">
-              <a:lnSpc>
-                <a:spcPct val="115000"/>
-              </a:lnSpc>
-              <a:buFont typeface="+mj-lt"/>
-              <a:buAutoNum type="arabicPeriod" startAt="11"/>
-            </a:pPr>
-            <a:r>
-              <a:rPr lang="en-US" sz="1800" kern="100" dirty="0">
-                <a:effectLst/>
-                <a:ea typeface="Aptos" panose="020B0004020202020204" pitchFamily="34" charset="0"/>
-                <a:cs typeface="Times New Roman" panose="02020603050405020304" pitchFamily="18" charset="0"/>
-              </a:rPr>
-              <a:t>Carbon dioxide  total [Moles/volume] in Blood</a:t>
-            </a:r>
-          </a:p>
-          <a:p>
-            <a:pPr marL="514350" marR="0" lvl="0" indent="-514350">
-              <a:lnSpc>
-                <a:spcPct val="115000"/>
-              </a:lnSpc>
-              <a:buFont typeface="+mj-lt"/>
-              <a:buAutoNum type="arabicPeriod" startAt="11"/>
-            </a:pPr>
-            <a:r>
-              <a:rPr lang="en-US" sz="1800" kern="100" dirty="0">
-                <a:effectLst/>
-                <a:ea typeface="Aptos" panose="020B0004020202020204" pitchFamily="34" charset="0"/>
-                <a:cs typeface="Times New Roman" panose="02020603050405020304" pitchFamily="18" charset="0"/>
-              </a:rPr>
-              <a:t>QALY (quality adjusted life years)</a:t>
-            </a:r>
-          </a:p>
-          <a:p>
-            <a:pPr marL="514350" marR="0" lvl="0" indent="-514350">
-              <a:lnSpc>
-                <a:spcPct val="115000"/>
-              </a:lnSpc>
-              <a:buFont typeface="+mj-lt"/>
-              <a:buAutoNum type="arabicPeriod" startAt="11"/>
-            </a:pPr>
-            <a:r>
-              <a:rPr lang="en-US" sz="1800" kern="100" dirty="0">
-                <a:effectLst/>
-                <a:ea typeface="Aptos" panose="020B0004020202020204" pitchFamily="34" charset="0"/>
-                <a:cs typeface="Times New Roman" panose="02020603050405020304" pitchFamily="18" charset="0"/>
-              </a:rPr>
-              <a:t>Creatinine [Mass/volume] in Blood</a:t>
-            </a:r>
-          </a:p>
-          <a:p>
-            <a:pPr marL="514350" marR="0" lvl="0" indent="-514350">
-              <a:lnSpc>
-                <a:spcPct val="115000"/>
-              </a:lnSpc>
-              <a:buFont typeface="+mj-lt"/>
-              <a:buAutoNum type="arabicPeriod" startAt="11"/>
-            </a:pPr>
-            <a:r>
-              <a:rPr lang="en-US" sz="1800" kern="100" dirty="0">
-                <a:effectLst/>
-                <a:ea typeface="Aptos" panose="020B0004020202020204" pitchFamily="34" charset="0"/>
-                <a:cs typeface="Times New Roman" panose="02020603050405020304" pitchFamily="18" charset="0"/>
-              </a:rPr>
-              <a:t>State population</a:t>
-            </a:r>
           </a:p>
         </p:txBody>
       </p:sp>

</xml_diff>